<commit_message>
All the codes and pictures added(some pictures to be added)
</commit_message>
<xml_diff>
--- a/IROS17/pictures/pdf/PositionNrobots.pptx
+++ b/IROS17/pictures/pdf/PositionNrobots.pptx
@@ -288,7 +288,7 @@
           <a:p>
             <a:fld id="{D9007BAF-787B-5B4F-8632-C84DCD7706EC}" type="datetimeFigureOut">
               <a:rPr lang="en-US" smtClean="0"/>
-              <a:t>9/6/16</a:t>
+              <a:t>2/24/17</a:t>
             </a:fld>
             <a:endParaRPr lang="en-US"/>
           </a:p>
@@ -458,7 +458,7 @@
           <a:p>
             <a:fld id="{D9007BAF-787B-5B4F-8632-C84DCD7706EC}" type="datetimeFigureOut">
               <a:rPr lang="en-US" smtClean="0"/>
-              <a:t>9/6/16</a:t>
+              <a:t>2/24/17</a:t>
             </a:fld>
             <a:endParaRPr lang="en-US"/>
           </a:p>
@@ -638,7 +638,7 @@
           <a:p>
             <a:fld id="{D9007BAF-787B-5B4F-8632-C84DCD7706EC}" type="datetimeFigureOut">
               <a:rPr lang="en-US" smtClean="0"/>
-              <a:t>9/6/16</a:t>
+              <a:t>2/24/17</a:t>
             </a:fld>
             <a:endParaRPr lang="en-US"/>
           </a:p>
@@ -808,7 +808,7 @@
           <a:p>
             <a:fld id="{D9007BAF-787B-5B4F-8632-C84DCD7706EC}" type="datetimeFigureOut">
               <a:rPr lang="en-US" smtClean="0"/>
-              <a:t>9/6/16</a:t>
+              <a:t>2/24/17</a:t>
             </a:fld>
             <a:endParaRPr lang="en-US"/>
           </a:p>
@@ -1054,7 +1054,7 @@
           <a:p>
             <a:fld id="{D9007BAF-787B-5B4F-8632-C84DCD7706EC}" type="datetimeFigureOut">
               <a:rPr lang="en-US" smtClean="0"/>
-              <a:t>9/6/16</a:t>
+              <a:t>2/24/17</a:t>
             </a:fld>
             <a:endParaRPr lang="en-US"/>
           </a:p>
@@ -1342,7 +1342,7 @@
           <a:p>
             <a:fld id="{D9007BAF-787B-5B4F-8632-C84DCD7706EC}" type="datetimeFigureOut">
               <a:rPr lang="en-US" smtClean="0"/>
-              <a:t>9/6/16</a:t>
+              <a:t>2/24/17</a:t>
             </a:fld>
             <a:endParaRPr lang="en-US"/>
           </a:p>
@@ -1764,7 +1764,7 @@
           <a:p>
             <a:fld id="{D9007BAF-787B-5B4F-8632-C84DCD7706EC}" type="datetimeFigureOut">
               <a:rPr lang="en-US" smtClean="0"/>
-              <a:t>9/6/16</a:t>
+              <a:t>2/24/17</a:t>
             </a:fld>
             <a:endParaRPr lang="en-US"/>
           </a:p>
@@ -1882,7 +1882,7 @@
           <a:p>
             <a:fld id="{D9007BAF-787B-5B4F-8632-C84DCD7706EC}" type="datetimeFigureOut">
               <a:rPr lang="en-US" smtClean="0"/>
-              <a:t>9/6/16</a:t>
+              <a:t>2/24/17</a:t>
             </a:fld>
             <a:endParaRPr lang="en-US"/>
           </a:p>
@@ -1977,7 +1977,7 @@
           <a:p>
             <a:fld id="{D9007BAF-787B-5B4F-8632-C84DCD7706EC}" type="datetimeFigureOut">
               <a:rPr lang="en-US" smtClean="0"/>
-              <a:t>9/6/16</a:t>
+              <a:t>2/24/17</a:t>
             </a:fld>
             <a:endParaRPr lang="en-US"/>
           </a:p>
@@ -2254,7 +2254,7 @@
           <a:p>
             <a:fld id="{D9007BAF-787B-5B4F-8632-C84DCD7706EC}" type="datetimeFigureOut">
               <a:rPr lang="en-US" smtClean="0"/>
-              <a:t>9/6/16</a:t>
+              <a:t>2/24/17</a:t>
             </a:fld>
             <a:endParaRPr lang="en-US"/>
           </a:p>
@@ -2507,7 +2507,7 @@
           <a:p>
             <a:fld id="{D9007BAF-787B-5B4F-8632-C84DCD7706EC}" type="datetimeFigureOut">
               <a:rPr lang="en-US" smtClean="0"/>
-              <a:t>9/6/16</a:t>
+              <a:t>2/24/17</a:t>
             </a:fld>
             <a:endParaRPr lang="en-US"/>
           </a:p>
@@ -2720,7 +2720,7 @@
           <a:p>
             <a:fld id="{D9007BAF-787B-5B4F-8632-C84DCD7706EC}" type="datetimeFigureOut">
               <a:rPr lang="en-US" smtClean="0"/>
-              <a:t>9/6/16</a:t>
+              <a:t>2/24/17</a:t>
             </a:fld>
             <a:endParaRPr lang="en-US"/>
           </a:p>
@@ -3540,7 +3540,7 @@
                 </a:avLst>
               </a:prstGeom>
               <a:solidFill>
-                <a:srgbClr val="FC028B"/>
+                <a:srgbClr val="953735"/>
               </a:solidFill>
               <a:ln>
                 <a:noFill/>
@@ -4308,7 +4308,7 @@
                 </a:avLst>
               </a:prstGeom>
               <a:solidFill>
-                <a:srgbClr val="FC028B"/>
+                <a:srgbClr val="953735"/>
               </a:solidFill>
               <a:ln>
                 <a:noFill/>
@@ -5081,7 +5081,7 @@
                 </a:avLst>
               </a:prstGeom>
               <a:solidFill>
-                <a:srgbClr val="FC028B"/>
+                <a:srgbClr val="953735"/>
               </a:solidFill>
               <a:ln>
                 <a:noFill/>
@@ -5849,7 +5849,7 @@
                 </a:avLst>
               </a:prstGeom>
               <a:solidFill>
-                <a:srgbClr val="FC028B"/>
+                <a:srgbClr val="953735"/>
               </a:solidFill>
               <a:ln>
                 <a:noFill/>
@@ -6617,7 +6617,9 @@
                 </a:avLst>
               </a:prstGeom>
               <a:solidFill>
-                <a:srgbClr val="FC028B"/>
+                <a:schemeClr val="accent2">
+                  <a:lumMod val="75000"/>
+                </a:schemeClr>
               </a:solidFill>
               <a:ln>
                 <a:noFill/>
@@ -7385,7 +7387,7 @@
                 </a:avLst>
               </a:prstGeom>
               <a:solidFill>
-                <a:srgbClr val="FC028B"/>
+                <a:srgbClr val="953735"/>
               </a:solidFill>
               <a:ln>
                 <a:noFill/>
@@ -8139,7 +8141,7 @@
               </a:avLst>
             </a:prstGeom>
             <a:solidFill>
-              <a:srgbClr val="FC028B"/>
+              <a:srgbClr val="953735"/>
             </a:solidFill>
             <a:ln>
               <a:noFill/>
@@ -8892,7 +8894,7 @@
               </a:avLst>
             </a:prstGeom>
             <a:solidFill>
-              <a:srgbClr val="FC028B"/>
+              <a:srgbClr val="953735"/>
             </a:solidFill>
             <a:ln>
               <a:noFill/>
@@ -9645,7 +9647,7 @@
               </a:avLst>
             </a:prstGeom>
             <a:solidFill>
-              <a:srgbClr val="FC028B"/>
+              <a:srgbClr val="953735"/>
             </a:solidFill>
             <a:ln>
               <a:noFill/>
@@ -10398,7 +10400,7 @@
               </a:avLst>
             </a:prstGeom>
             <a:solidFill>
-              <a:srgbClr val="FC028B"/>
+              <a:srgbClr val="953735"/>
             </a:solidFill>
             <a:ln>
               <a:noFill/>
@@ -11151,7 +11153,7 @@
               </a:avLst>
             </a:prstGeom>
             <a:solidFill>
-              <a:srgbClr val="FC028B"/>
+              <a:srgbClr val="953735"/>
             </a:solidFill>
             <a:ln>
               <a:noFill/>
@@ -11904,7 +11906,7 @@
               </a:avLst>
             </a:prstGeom>
             <a:solidFill>
-              <a:srgbClr val="FC028B"/>
+              <a:srgbClr val="953735"/>
             </a:solidFill>
             <a:ln>
               <a:noFill/>
@@ -12816,7 +12818,7 @@
               </a:avLst>
             </a:prstGeom>
             <a:solidFill>
-              <a:srgbClr val="FC028B"/>
+              <a:srgbClr val="953735"/>
             </a:solidFill>
             <a:ln>
               <a:noFill/>
@@ -13569,7 +13571,7 @@
               </a:avLst>
             </a:prstGeom>
             <a:solidFill>
-              <a:srgbClr val="FC028B"/>
+              <a:srgbClr val="953735"/>
             </a:solidFill>
             <a:ln>
               <a:noFill/>
@@ -14322,7 +14324,7 @@
               </a:avLst>
             </a:prstGeom>
             <a:solidFill>
-              <a:srgbClr val="FC028B"/>
+              <a:srgbClr val="953735"/>
             </a:solidFill>
             <a:ln>
               <a:noFill/>
@@ -15075,7 +15077,7 @@
               </a:avLst>
             </a:prstGeom>
             <a:solidFill>
-              <a:srgbClr val="FC028B"/>
+              <a:srgbClr val="953735"/>
             </a:solidFill>
             <a:ln>
               <a:noFill/>
@@ -15828,7 +15830,7 @@
               </a:avLst>
             </a:prstGeom>
             <a:solidFill>
-              <a:srgbClr val="FC028B"/>
+              <a:srgbClr val="953735"/>
             </a:solidFill>
             <a:ln>
               <a:noFill/>
@@ -16581,7 +16583,7 @@
               </a:avLst>
             </a:prstGeom>
             <a:solidFill>
-              <a:srgbClr val="FC028B"/>
+              <a:srgbClr val="953735"/>
             </a:solidFill>
             <a:ln>
               <a:noFill/>
@@ -21834,7 +21836,9 @@
             </a:avLst>
           </a:prstGeom>
           <a:solidFill>
-            <a:srgbClr val="FC028B"/>
+            <a:schemeClr val="accent2">
+              <a:lumMod val="75000"/>
+            </a:schemeClr>
           </a:solidFill>
           <a:ln>
             <a:noFill/>

</xml_diff>